<commit_message>
reflecting feedback in email
</commit_message>
<xml_diff>
--- a/media-source/dynamics365-customer-service-copilot-architecture.pptx
+++ b/media-source/dynamics365-customer-service-copilot-architecture.pptx
@@ -217,7 +217,7 @@
           <a:p>
             <a:fld id="{91032F62-06CC-4667-AB80-617E317F4D0D}" type="datetimeFigureOut">
               <a:rPr lang="en-US" smtClean="0"/>
-              <a:t>12/4/2023</a:t>
+              <a:t>12/18/2023</a:t>
             </a:fld>
             <a:endParaRPr lang="en-US"/>
           </a:p>
@@ -718,7 +718,7 @@
           <a:p>
             <a:fld id="{C33375F9-F096-4D61-B6DA-A278B59CFE1A}" type="datetimeFigureOut">
               <a:rPr lang="en-US" smtClean="0"/>
-              <a:t>12/4/2023</a:t>
+              <a:t>12/18/2023</a:t>
             </a:fld>
             <a:endParaRPr lang="en-US"/>
           </a:p>
@@ -916,7 +916,7 @@
           <a:p>
             <a:fld id="{C33375F9-F096-4D61-B6DA-A278B59CFE1A}" type="datetimeFigureOut">
               <a:rPr lang="en-US" smtClean="0"/>
-              <a:t>12/4/2023</a:t>
+              <a:t>12/18/2023</a:t>
             </a:fld>
             <a:endParaRPr lang="en-US"/>
           </a:p>
@@ -1124,7 +1124,7 @@
           <a:p>
             <a:fld id="{C33375F9-F096-4D61-B6DA-A278B59CFE1A}" type="datetimeFigureOut">
               <a:rPr lang="en-US" smtClean="0"/>
-              <a:t>12/4/2023</a:t>
+              <a:t>12/18/2023</a:t>
             </a:fld>
             <a:endParaRPr lang="en-US"/>
           </a:p>
@@ -1322,7 +1322,7 @@
           <a:p>
             <a:fld id="{C33375F9-F096-4D61-B6DA-A278B59CFE1A}" type="datetimeFigureOut">
               <a:rPr lang="en-US" smtClean="0"/>
-              <a:t>12/4/2023</a:t>
+              <a:t>12/18/2023</a:t>
             </a:fld>
             <a:endParaRPr lang="en-US"/>
           </a:p>
@@ -1597,7 +1597,7 @@
           <a:p>
             <a:fld id="{C33375F9-F096-4D61-B6DA-A278B59CFE1A}" type="datetimeFigureOut">
               <a:rPr lang="en-US" smtClean="0"/>
-              <a:t>12/4/2023</a:t>
+              <a:t>12/18/2023</a:t>
             </a:fld>
             <a:endParaRPr lang="en-US"/>
           </a:p>
@@ -1862,7 +1862,7 @@
           <a:p>
             <a:fld id="{C33375F9-F096-4D61-B6DA-A278B59CFE1A}" type="datetimeFigureOut">
               <a:rPr lang="en-US" smtClean="0"/>
-              <a:t>12/4/2023</a:t>
+              <a:t>12/18/2023</a:t>
             </a:fld>
             <a:endParaRPr lang="en-US"/>
           </a:p>
@@ -2274,7 +2274,7 @@
           <a:p>
             <a:fld id="{C33375F9-F096-4D61-B6DA-A278B59CFE1A}" type="datetimeFigureOut">
               <a:rPr lang="en-US" smtClean="0"/>
-              <a:t>12/4/2023</a:t>
+              <a:t>12/18/2023</a:t>
             </a:fld>
             <a:endParaRPr lang="en-US"/>
           </a:p>
@@ -2415,7 +2415,7 @@
           <a:p>
             <a:fld id="{C33375F9-F096-4D61-B6DA-A278B59CFE1A}" type="datetimeFigureOut">
               <a:rPr lang="en-US" smtClean="0"/>
-              <a:t>12/4/2023</a:t>
+              <a:t>12/18/2023</a:t>
             </a:fld>
             <a:endParaRPr lang="en-US"/>
           </a:p>
@@ -2528,7 +2528,7 @@
           <a:p>
             <a:fld id="{C33375F9-F096-4D61-B6DA-A278B59CFE1A}" type="datetimeFigureOut">
               <a:rPr lang="en-US" smtClean="0"/>
-              <a:t>12/4/2023</a:t>
+              <a:t>12/18/2023</a:t>
             </a:fld>
             <a:endParaRPr lang="en-US"/>
           </a:p>
@@ -2839,7 +2839,7 @@
           <a:p>
             <a:fld id="{C33375F9-F096-4D61-B6DA-A278B59CFE1A}" type="datetimeFigureOut">
               <a:rPr lang="en-US" smtClean="0"/>
-              <a:t>12/4/2023</a:t>
+              <a:t>12/18/2023</a:t>
             </a:fld>
             <a:endParaRPr lang="en-US"/>
           </a:p>
@@ -3127,7 +3127,7 @@
           <a:p>
             <a:fld id="{C33375F9-F096-4D61-B6DA-A278B59CFE1A}" type="datetimeFigureOut">
               <a:rPr lang="en-US" smtClean="0"/>
-              <a:t>12/4/2023</a:t>
+              <a:t>12/18/2023</a:t>
             </a:fld>
             <a:endParaRPr lang="en-US"/>
           </a:p>
@@ -3368,7 +3368,7 @@
           <a:p>
             <a:fld id="{C33375F9-F096-4D61-B6DA-A278B59CFE1A}" type="datetimeFigureOut">
               <a:rPr lang="en-US" smtClean="0"/>
-              <a:t>12/4/2023</a:t>
+              <a:t>12/18/2023</a:t>
             </a:fld>
             <a:endParaRPr lang="en-US"/>
           </a:p>
@@ -3993,8 +3993,8 @@
         </p:nvCxnSpPr>
         <p:spPr>
           <a:xfrm flipV="1">
-            <a:off x="5724080" y="3470564"/>
-            <a:ext cx="1907004" cy="48578"/>
+            <a:off x="5692327" y="3470564"/>
+            <a:ext cx="1938757" cy="8596"/>
           </a:xfrm>
           <a:prstGeom prst="straightConnector1">
             <a:avLst/>
@@ -4034,8 +4034,8 @@
         </p:nvCxnSpPr>
         <p:spPr>
           <a:xfrm flipH="1">
-            <a:off x="5601222" y="3661756"/>
-            <a:ext cx="2063113" cy="35173"/>
+            <a:off x="5601222" y="3655686"/>
+            <a:ext cx="2122962" cy="41243"/>
           </a:xfrm>
           <a:prstGeom prst="straightConnector1">
             <a:avLst/>
@@ -4754,7 +4754,7 @@
         <p:spPr>
           <a:xfrm>
             <a:off x="5365980" y="1588670"/>
-            <a:ext cx="2179379" cy="276999"/>
+            <a:ext cx="2389372" cy="276999"/>
           </a:xfrm>
           <a:prstGeom prst="rect">
             <a:avLst/>
@@ -4768,10 +4768,9 @@
           <a:lstStyle/>
           <a:p>
             <a:r>
-              <a:rPr lang="en-US" sz="1200"/>
-              <a:t>Dynamics 365 Service boundary</a:t>
-            </a:r>
-            <a:endParaRPr lang="en-US" sz="1200" dirty="0"/>
+              <a:rPr lang="en-US" sz="1200" dirty="0"/>
+              <a:t>Service boundary for Dynamics 365</a:t>
+            </a:r>
           </a:p>
         </p:txBody>
       </p:sp>
@@ -5470,7 +5469,7 @@
         </p:nvSpPr>
         <p:spPr>
           <a:xfrm>
-            <a:off x="2934451" y="2627987"/>
+            <a:off x="2934451" y="2671253"/>
             <a:ext cx="1037463" cy="276999"/>
           </a:xfrm>
           <a:prstGeom prst="rect">
@@ -5575,7 +5574,7 @@
         </p:nvSpPr>
         <p:spPr>
           <a:xfrm>
-            <a:off x="6205765" y="3183281"/>
+            <a:off x="6138641" y="3077871"/>
             <a:ext cx="1253869" cy="276999"/>
           </a:xfrm>
           <a:prstGeom prst="rect">
@@ -5768,8 +5767,8 @@
         </p:nvSpPr>
         <p:spPr>
           <a:xfrm>
-            <a:off x="3802366" y="474237"/>
-            <a:ext cx="6533816" cy="954107"/>
+            <a:off x="2641276" y="735384"/>
+            <a:ext cx="7054449" cy="523220"/>
           </a:xfrm>
           <a:prstGeom prst="rect">
             <a:avLst/>
@@ -5785,14 +5784,7 @@
             <a:pPr algn="ctr"/>
             <a:r>
               <a:rPr lang="en-US" sz="2800" b="1" dirty="0"/>
-              <a:t>Copilot for</a:t>
-            </a:r>
-            <a:br>
-              <a:rPr lang="en-US" sz="2800" b="1" dirty="0"/>
-            </a:br>
-            <a:r>
-              <a:rPr lang="en-US" sz="2800" b="1" dirty="0"/>
-              <a:t>Dynamics 365 Customer Service </a:t>
+              <a:t>Copilot in Dynamics 365 Customer Service </a:t>
             </a:r>
             <a:endParaRPr lang="en-US" dirty="0"/>
           </a:p>
@@ -6471,6 +6463,19 @@
 </file>
 
 <file path=customXml/item1.xml><?xml version="1.0" encoding="utf-8"?>
+<p:properties xmlns:p="http://schemas.microsoft.com/office/2006/metadata/properties" xmlns:xsi="http://www.w3.org/2001/XMLSchema-instance" xmlns:pc="http://schemas.microsoft.com/office/infopath/2007/PartnerControls">
+  <documentManagement>
+    <_ip_UnifiedCompliancePolicyUIAction xmlns="http://schemas.microsoft.com/sharepoint/v3" xsi:nil="true"/>
+    <lcf76f155ced4ddcb4097134ff3c332f xmlns="c6efd2d4-75b1-4410-95d8-ccc4fc63ed7c">
+      <Terms xmlns="http://schemas.microsoft.com/office/infopath/2007/PartnerControls"/>
+    </lcf76f155ced4ddcb4097134ff3c332f>
+    <_ip_UnifiedCompliancePolicyProperties xmlns="http://schemas.microsoft.com/sharepoint/v3" xsi:nil="true"/>
+    <TaxCatchAll xmlns="230e9df3-be65-4c73-a93b-d1236ebd677e" xsi:nil="true"/>
+  </documentManagement>
+</p:properties>
+</file>
+
+<file path=customXml/item2.xml><?xml version="1.0" encoding="utf-8"?>
 <ct:contentTypeSchema xmlns:ct="http://schemas.microsoft.com/office/2006/metadata/contentType" xmlns:ma="http://schemas.microsoft.com/office/2006/metadata/properties/metaAttributes" ct:_="" ma:_="" ma:contentTypeName="Document" ma:contentTypeID="0x010100DDFA7B3E5C25B747AAE90421461A53C4" ma:contentTypeVersion="21" ma:contentTypeDescription="Create a new document." ma:contentTypeScope="" ma:versionID="1c3e70babcedce2d97f9c615b1a735b9">
   <xsd:schema xmlns:xsd="http://www.w3.org/2001/XMLSchema" xmlns:xs="http://www.w3.org/2001/XMLSchema" xmlns:p="http://schemas.microsoft.com/office/2006/metadata/properties" xmlns:ns1="http://schemas.microsoft.com/sharepoint/v3" xmlns:ns2="c6efd2d4-75b1-4410-95d8-ccc4fc63ed7c" xmlns:ns3="0cafd614-d260-4417-87da-0370da2d90b7" xmlns:ns4="230e9df3-be65-4c73-a93b-d1236ebd677e" targetNamespace="http://schemas.microsoft.com/office/2006/metadata/properties" ma:root="true" ma:fieldsID="dddd7f504b7573c396dea092bdd50832" ns1:_="" ns2:_="" ns3:_="" ns4:_="">
     <xsd:import namespace="http://schemas.microsoft.com/sharepoint/v3"/>
@@ -6747,19 +6752,6 @@
 </ct:contentTypeSchema>
 </file>
 
-<file path=customXml/item2.xml><?xml version="1.0" encoding="utf-8"?>
-<p:properties xmlns:p="http://schemas.microsoft.com/office/2006/metadata/properties" xmlns:xsi="http://www.w3.org/2001/XMLSchema-instance" xmlns:pc="http://schemas.microsoft.com/office/infopath/2007/PartnerControls">
-  <documentManagement>
-    <_ip_UnifiedCompliancePolicyUIAction xmlns="http://schemas.microsoft.com/sharepoint/v3" xsi:nil="true"/>
-    <lcf76f155ced4ddcb4097134ff3c332f xmlns="c6efd2d4-75b1-4410-95d8-ccc4fc63ed7c">
-      <Terms xmlns="http://schemas.microsoft.com/office/infopath/2007/PartnerControls"/>
-    </lcf76f155ced4ddcb4097134ff3c332f>
-    <_ip_UnifiedCompliancePolicyProperties xmlns="http://schemas.microsoft.com/sharepoint/v3" xsi:nil="true"/>
-    <TaxCatchAll xmlns="230e9df3-be65-4c73-a93b-d1236ebd677e" xsi:nil="true"/>
-  </documentManagement>
-</p:properties>
-</file>
-
 <file path=customXml/item3.xml><?xml version="1.0" encoding="utf-8"?>
 <?mso-contentType ?>
 <FormTemplates xmlns="http://schemas.microsoft.com/sharepoint/v3/contenttype/forms">
@@ -6770,6 +6762,25 @@
 </file>
 
 <file path=customXml/itemProps1.xml><?xml version="1.0" encoding="utf-8"?>
+<ds:datastoreItem xmlns:ds="http://schemas.openxmlformats.org/officeDocument/2006/customXml" ds:itemID="{FDD55578-C330-4E3E-8D67-022AF20D7A2E}">
+  <ds:schemaRefs>
+    <ds:schemaRef ds:uri="0cafd614-d260-4417-87da-0370da2d90b7"/>
+    <ds:schemaRef ds:uri="230e9df3-be65-4c73-a93b-d1236ebd677e"/>
+    <ds:schemaRef ds:uri="c6efd2d4-75b1-4410-95d8-ccc4fc63ed7c"/>
+    <ds:schemaRef ds:uri="http://purl.org/dc/dcmitype/"/>
+    <ds:schemaRef ds:uri="http://purl.org/dc/elements/1.1/"/>
+    <ds:schemaRef ds:uri="http://purl.org/dc/terms/"/>
+    <ds:schemaRef ds:uri="http://schemas.microsoft.com/office/2006/documentManagement/types"/>
+    <ds:schemaRef ds:uri="http://schemas.microsoft.com/office/2006/metadata/properties"/>
+    <ds:schemaRef ds:uri="http://schemas.microsoft.com/office/infopath/2007/PartnerControls"/>
+    <ds:schemaRef ds:uri="http://schemas.microsoft.com/sharepoint/v3"/>
+    <ds:schemaRef ds:uri="http://schemas.openxmlformats.org/package/2006/metadata/core-properties"/>
+    <ds:schemaRef ds:uri="http://www.w3.org/XML/1998/namespace"/>
+  </ds:schemaRefs>
+</ds:datastoreItem>
+</file>
+
+<file path=customXml/itemProps2.xml><?xml version="1.0" encoding="utf-8"?>
 <ds:datastoreItem xmlns:ds="http://schemas.openxmlformats.org/officeDocument/2006/customXml" ds:itemID="{0A927258-1AAA-4870-99C9-8D1274192AB4}">
   <ds:schemaRefs>
     <ds:schemaRef ds:uri="0cafd614-d260-4417-87da-0370da2d90b7"/>
@@ -6790,25 +6801,6 @@
 </ds:datastoreItem>
 </file>
 
-<file path=customXml/itemProps2.xml><?xml version="1.0" encoding="utf-8"?>
-<ds:datastoreItem xmlns:ds="http://schemas.openxmlformats.org/officeDocument/2006/customXml" ds:itemID="{FDD55578-C330-4E3E-8D67-022AF20D7A2E}">
-  <ds:schemaRefs>
-    <ds:schemaRef ds:uri="0cafd614-d260-4417-87da-0370da2d90b7"/>
-    <ds:schemaRef ds:uri="230e9df3-be65-4c73-a93b-d1236ebd677e"/>
-    <ds:schemaRef ds:uri="c6efd2d4-75b1-4410-95d8-ccc4fc63ed7c"/>
-    <ds:schemaRef ds:uri="http://purl.org/dc/dcmitype/"/>
-    <ds:schemaRef ds:uri="http://purl.org/dc/elements/1.1/"/>
-    <ds:schemaRef ds:uri="http://purl.org/dc/terms/"/>
-    <ds:schemaRef ds:uri="http://schemas.microsoft.com/office/2006/documentManagement/types"/>
-    <ds:schemaRef ds:uri="http://schemas.microsoft.com/office/2006/metadata/properties"/>
-    <ds:schemaRef ds:uri="http://schemas.microsoft.com/office/infopath/2007/PartnerControls"/>
-    <ds:schemaRef ds:uri="http://schemas.microsoft.com/sharepoint/v3"/>
-    <ds:schemaRef ds:uri="http://schemas.openxmlformats.org/package/2006/metadata/core-properties"/>
-    <ds:schemaRef ds:uri="http://www.w3.org/XML/1998/namespace"/>
-  </ds:schemaRefs>
-</ds:datastoreItem>
-</file>
-
 <file path=customXml/itemProps3.xml><?xml version="1.0" encoding="utf-8"?>
 <ds:datastoreItem xmlns:ds="http://schemas.openxmlformats.org/officeDocument/2006/customXml" ds:itemID="{5D56D8C6-0B0D-4B72-B0BF-E3AF7E737B81}">
   <ds:schemaRefs>

</xml_diff>